<commit_message>
Update Salary & Attrition at Frito Lay Final.pptx
</commit_message>
<xml_diff>
--- a/Salary & Attrition at Frito Lay Final.pptx
+++ b/Salary & Attrition at Frito Lay Final.pptx
@@ -14005,8 +14005,26 @@
           <a:p>
             <a:r>
               <a:rPr lang="en-US" dirty="0"/>
-              <a:t>Over Time, Job Involvement, Job Satisfaction.</a:t>
+              <a:t>Over Time (p &lt; 0.0001)</a:t>
             </a:r>
+          </a:p>
+          <a:p>
+            <a:r>
+              <a:rPr lang="en-US" dirty="0"/>
+              <a:t>Job Involvement (p &lt; 0.0001)</a:t>
+            </a:r>
+          </a:p>
+          <a:p>
+            <a:r>
+              <a:rPr lang="en-US" dirty="0"/>
+              <a:t>Job Satisfaction (p &lt; 0.0001)</a:t>
+            </a:r>
+          </a:p>
+          <a:p>
+            <a:pPr marL="0" indent="0">
+              <a:buNone/>
+            </a:pPr>
+            <a:endParaRPr lang="en-US" dirty="0"/>
           </a:p>
         </p:txBody>
       </p:sp>
@@ -14047,10 +14065,10 @@
       </p:sp>
       <p:pic>
         <p:nvPicPr>
-          <p:cNvPr id="18" name="Picture Placeholder 9" descr="cityscape">
-            <a:extLst>
-              <a:ext uri="{FF2B5EF4-FFF2-40B4-BE49-F238E27FC236}">
-                <a16:creationId xmlns:a16="http://schemas.microsoft.com/office/drawing/2014/main" id="{03A2AE5D-3B31-4B35-A4D0-F014CE661A61}"/>
+          <p:cNvPr id="12" name="Picture 11">
+            <a:extLst>
+              <a:ext uri="{FF2B5EF4-FFF2-40B4-BE49-F238E27FC236}">
+                <a16:creationId xmlns:a16="http://schemas.microsoft.com/office/drawing/2014/main" id="{9F855EBF-87A3-41E9-ABC1-97C14A913147}"/>
               </a:ext>
             </a:extLst>
           </p:cNvPr>
@@ -14060,22 +14078,15 @@
           <p:nvPr/>
         </p:nvPicPr>
         <p:blipFill>
-          <a:blip r:embed="rId3" cstate="print">
-            <a:extLst>
-              <a:ext uri="{28A0092B-C50C-407E-A947-70E740481C1C}">
-                <a14:useLocalDpi xmlns:a14="http://schemas.microsoft.com/office/drawing/2010/main"/>
-              </a:ext>
-            </a:extLst>
-          </a:blip>
-          <a:srcRect/>
+          <a:blip r:embed="rId3"/>
           <a:stretch>
             <a:fillRect/>
           </a:stretch>
         </p:blipFill>
         <p:spPr>
           <a:xfrm>
-            <a:off x="8216747" y="1952978"/>
-            <a:ext cx="3326319" cy="3326319"/>
+            <a:off x="6980061" y="2470501"/>
+            <a:ext cx="4914900" cy="2981325"/>
           </a:xfrm>
           <a:prstGeom prst="rect">
             <a:avLst/>

</xml_diff>